<commit_message>
network sec final presentation
</commit_message>
<xml_diff>
--- a/Network Security/assignments/assignment2/presentation/Presentation.pptx
+++ b/Network Security/assignments/assignment2/presentation/Presentation.pptx
@@ -4,9 +4,27 @@
   <p:sldMasterIdLst>
     <p:sldMasterId id="2147483960" r:id="rId1"/>
   </p:sldMasterIdLst>
+  <p:notesMasterIdLst>
+    <p:notesMasterId r:id="rId19"/>
+  </p:notesMasterIdLst>
   <p:sldIdLst>
     <p:sldId id="256" r:id="rId2"/>
     <p:sldId id="257" r:id="rId3"/>
+    <p:sldId id="258" r:id="rId4"/>
+    <p:sldId id="259" r:id="rId5"/>
+    <p:sldId id="260" r:id="rId6"/>
+    <p:sldId id="262" r:id="rId7"/>
+    <p:sldId id="261" r:id="rId8"/>
+    <p:sldId id="263" r:id="rId9"/>
+    <p:sldId id="264" r:id="rId10"/>
+    <p:sldId id="265" r:id="rId11"/>
+    <p:sldId id="266" r:id="rId12"/>
+    <p:sldId id="267" r:id="rId13"/>
+    <p:sldId id="268" r:id="rId14"/>
+    <p:sldId id="269" r:id="rId15"/>
+    <p:sldId id="270" r:id="rId16"/>
+    <p:sldId id="271" r:id="rId17"/>
+    <p:sldId id="272" r:id="rId18"/>
   </p:sldIdLst>
   <p:sldSz cx="9144000" cy="6858000" type="screen4x3"/>
   <p:notesSz cx="6858000" cy="9144000"/>
@@ -108,6 +126,723 @@
 </p:presentation>
 </file>
 
+<file path=ppt/notesMasters/notesMaster1.xml><?xml version="1.0" encoding="utf-8"?>
+<p:notesMaster xmlns:a="http://schemas.openxmlformats.org/drawingml/2006/main" xmlns:r="http://schemas.openxmlformats.org/officeDocument/2006/relationships" xmlns:p="http://schemas.openxmlformats.org/presentationml/2006/main">
+  <p:cSld>
+    <p:bg>
+      <p:bgRef idx="1001">
+        <a:schemeClr val="bg1"/>
+      </p:bgRef>
+    </p:bg>
+    <p:spTree>
+      <p:nvGrpSpPr>
+        <p:cNvPr id="1" name=""/>
+        <p:cNvGrpSpPr/>
+        <p:nvPr/>
+      </p:nvGrpSpPr>
+      <p:grpSpPr>
+        <a:xfrm>
+          <a:off x="0" y="0"/>
+          <a:ext cx="0" cy="0"/>
+          <a:chOff x="0" y="0"/>
+          <a:chExt cx="0" cy="0"/>
+        </a:xfrm>
+      </p:grpSpPr>
+      <p:sp>
+        <p:nvSpPr>
+          <p:cNvPr id="2" name="Header Placeholder 1"/>
+          <p:cNvSpPr>
+            <a:spLocks noGrp="1"/>
+          </p:cNvSpPr>
+          <p:nvPr>
+            <p:ph type="hdr" sz="quarter"/>
+          </p:nvPr>
+        </p:nvSpPr>
+        <p:spPr>
+          <a:xfrm>
+            <a:off x="0" y="0"/>
+            <a:ext cx="2971800" cy="457200"/>
+          </a:xfrm>
+          <a:prstGeom prst="rect">
+            <a:avLst/>
+          </a:prstGeom>
+        </p:spPr>
+        <p:txBody>
+          <a:bodyPr vert="horz" lIns="91440" tIns="45720" rIns="91440" bIns="45720" rtlCol="0"/>
+          <a:lstStyle>
+            <a:lvl1pPr algn="l">
+              <a:defRPr sz="1200"/>
+            </a:lvl1pPr>
+          </a:lstStyle>
+          <a:p>
+            <a:endParaRPr lang="en-CA"/>
+          </a:p>
+        </p:txBody>
+      </p:sp>
+      <p:sp>
+        <p:nvSpPr>
+          <p:cNvPr id="3" name="Date Placeholder 2"/>
+          <p:cNvSpPr>
+            <a:spLocks noGrp="1"/>
+          </p:cNvSpPr>
+          <p:nvPr>
+            <p:ph type="dt" idx="1"/>
+          </p:nvPr>
+        </p:nvSpPr>
+        <p:spPr>
+          <a:xfrm>
+            <a:off x="3884613" y="0"/>
+            <a:ext cx="2971800" cy="457200"/>
+          </a:xfrm>
+          <a:prstGeom prst="rect">
+            <a:avLst/>
+          </a:prstGeom>
+        </p:spPr>
+        <p:txBody>
+          <a:bodyPr vert="horz" lIns="91440" tIns="45720" rIns="91440" bIns="45720" rtlCol="0"/>
+          <a:lstStyle>
+            <a:lvl1pPr algn="r">
+              <a:defRPr sz="1200"/>
+            </a:lvl1pPr>
+          </a:lstStyle>
+          <a:p>
+            <a:fld id="{BE639132-B141-4A9D-8C20-B96219274006}" type="datetimeFigureOut">
+              <a:rPr lang="en-CA" smtClean="0"/>
+              <a:t>2014-06-03</a:t>
+            </a:fld>
+            <a:endParaRPr lang="en-CA"/>
+          </a:p>
+        </p:txBody>
+      </p:sp>
+      <p:sp>
+        <p:nvSpPr>
+          <p:cNvPr id="4" name="Slide Image Placeholder 3"/>
+          <p:cNvSpPr>
+            <a:spLocks noGrp="1" noRot="1" noChangeAspect="1"/>
+          </p:cNvSpPr>
+          <p:nvPr>
+            <p:ph type="sldImg" idx="2"/>
+          </p:nvPr>
+        </p:nvSpPr>
+        <p:spPr>
+          <a:xfrm>
+            <a:off x="1143000" y="685800"/>
+            <a:ext cx="4572000" cy="3429000"/>
+          </a:xfrm>
+          <a:prstGeom prst="rect">
+            <a:avLst/>
+          </a:prstGeom>
+          <a:noFill/>
+          <a:ln w="12700">
+            <a:solidFill>
+              <a:prstClr val="black"/>
+            </a:solidFill>
+          </a:ln>
+        </p:spPr>
+        <p:txBody>
+          <a:bodyPr vert="horz" lIns="91440" tIns="45720" rIns="91440" bIns="45720" rtlCol="0" anchor="ctr"/>
+          <a:lstStyle/>
+          <a:p>
+            <a:endParaRPr lang="en-CA"/>
+          </a:p>
+        </p:txBody>
+      </p:sp>
+      <p:sp>
+        <p:nvSpPr>
+          <p:cNvPr id="5" name="Notes Placeholder 4"/>
+          <p:cNvSpPr>
+            <a:spLocks noGrp="1"/>
+          </p:cNvSpPr>
+          <p:nvPr>
+            <p:ph type="body" sz="quarter" idx="3"/>
+          </p:nvPr>
+        </p:nvSpPr>
+        <p:spPr>
+          <a:xfrm>
+            <a:off x="685800" y="4343400"/>
+            <a:ext cx="5486400" cy="4114800"/>
+          </a:xfrm>
+          <a:prstGeom prst="rect">
+            <a:avLst/>
+          </a:prstGeom>
+        </p:spPr>
+        <p:txBody>
+          <a:bodyPr vert="horz" lIns="91440" tIns="45720" rIns="91440" bIns="45720" rtlCol="0">
+            <a:normAutofit/>
+          </a:bodyPr>
+          <a:lstStyle/>
+          <a:p>
+            <a:pPr lvl="0"/>
+            <a:r>
+              <a:rPr lang="en-US" smtClean="0"/>
+              <a:t>Click to edit Master text styles</a:t>
+            </a:r>
+          </a:p>
+          <a:p>
+            <a:pPr lvl="1"/>
+            <a:r>
+              <a:rPr lang="en-US" smtClean="0"/>
+              <a:t>Second level</a:t>
+            </a:r>
+          </a:p>
+          <a:p>
+            <a:pPr lvl="2"/>
+            <a:r>
+              <a:rPr lang="en-US" smtClean="0"/>
+              <a:t>Third level</a:t>
+            </a:r>
+          </a:p>
+          <a:p>
+            <a:pPr lvl="3"/>
+            <a:r>
+              <a:rPr lang="en-US" smtClean="0"/>
+              <a:t>Fourth level</a:t>
+            </a:r>
+          </a:p>
+          <a:p>
+            <a:pPr lvl="4"/>
+            <a:r>
+              <a:rPr lang="en-US" smtClean="0"/>
+              <a:t>Fifth level</a:t>
+            </a:r>
+            <a:endParaRPr lang="en-CA"/>
+          </a:p>
+        </p:txBody>
+      </p:sp>
+      <p:sp>
+        <p:nvSpPr>
+          <p:cNvPr id="6" name="Footer Placeholder 5"/>
+          <p:cNvSpPr>
+            <a:spLocks noGrp="1"/>
+          </p:cNvSpPr>
+          <p:nvPr>
+            <p:ph type="ftr" sz="quarter" idx="4"/>
+          </p:nvPr>
+        </p:nvSpPr>
+        <p:spPr>
+          <a:xfrm>
+            <a:off x="0" y="8685213"/>
+            <a:ext cx="2971800" cy="457200"/>
+          </a:xfrm>
+          <a:prstGeom prst="rect">
+            <a:avLst/>
+          </a:prstGeom>
+        </p:spPr>
+        <p:txBody>
+          <a:bodyPr vert="horz" lIns="91440" tIns="45720" rIns="91440" bIns="45720" rtlCol="0" anchor="b"/>
+          <a:lstStyle>
+            <a:lvl1pPr algn="l">
+              <a:defRPr sz="1200"/>
+            </a:lvl1pPr>
+          </a:lstStyle>
+          <a:p>
+            <a:endParaRPr lang="en-CA"/>
+          </a:p>
+        </p:txBody>
+      </p:sp>
+      <p:sp>
+        <p:nvSpPr>
+          <p:cNvPr id="7" name="Slide Number Placeholder 6"/>
+          <p:cNvSpPr>
+            <a:spLocks noGrp="1"/>
+          </p:cNvSpPr>
+          <p:nvPr>
+            <p:ph type="sldNum" sz="quarter" idx="5"/>
+          </p:nvPr>
+        </p:nvSpPr>
+        <p:spPr>
+          <a:xfrm>
+            <a:off x="3884613" y="8685213"/>
+            <a:ext cx="2971800" cy="457200"/>
+          </a:xfrm>
+          <a:prstGeom prst="rect">
+            <a:avLst/>
+          </a:prstGeom>
+        </p:spPr>
+        <p:txBody>
+          <a:bodyPr vert="horz" lIns="91440" tIns="45720" rIns="91440" bIns="45720" rtlCol="0" anchor="b"/>
+          <a:lstStyle>
+            <a:lvl1pPr algn="r">
+              <a:defRPr sz="1200"/>
+            </a:lvl1pPr>
+          </a:lstStyle>
+          <a:p>
+            <a:fld id="{B566A6A9-DC25-4FD7-8930-1DCB0B360AE2}" type="slidenum">
+              <a:rPr lang="en-CA" smtClean="0"/>
+              <a:t>‹#›</a:t>
+            </a:fld>
+            <a:endParaRPr lang="en-CA"/>
+          </a:p>
+        </p:txBody>
+      </p:sp>
+    </p:spTree>
+  </p:cSld>
+  <p:clrMap bg1="lt1" tx1="dk1" bg2="lt2" tx2="dk2" accent1="accent1" accent2="accent2" accent3="accent3" accent4="accent4" accent5="accent5" accent6="accent6" hlink="hlink" folHlink="folHlink"/>
+  <p:notesStyle>
+    <a:lvl1pPr marL="0" algn="l" defTabSz="914400" rtl="0" eaLnBrk="1" latinLnBrk="0" hangingPunct="1">
+      <a:defRPr sz="1200" kern="1200">
+        <a:solidFill>
+          <a:schemeClr val="tx1"/>
+        </a:solidFill>
+        <a:latin typeface="+mn-lt"/>
+        <a:ea typeface="+mn-ea"/>
+        <a:cs typeface="+mn-cs"/>
+      </a:defRPr>
+    </a:lvl1pPr>
+    <a:lvl2pPr marL="457200" algn="l" defTabSz="914400" rtl="0" eaLnBrk="1" latinLnBrk="0" hangingPunct="1">
+      <a:defRPr sz="1200" kern="1200">
+        <a:solidFill>
+          <a:schemeClr val="tx1"/>
+        </a:solidFill>
+        <a:latin typeface="+mn-lt"/>
+        <a:ea typeface="+mn-ea"/>
+        <a:cs typeface="+mn-cs"/>
+      </a:defRPr>
+    </a:lvl2pPr>
+    <a:lvl3pPr marL="914400" algn="l" defTabSz="914400" rtl="0" eaLnBrk="1" latinLnBrk="0" hangingPunct="1">
+      <a:defRPr sz="1200" kern="1200">
+        <a:solidFill>
+          <a:schemeClr val="tx1"/>
+        </a:solidFill>
+        <a:latin typeface="+mn-lt"/>
+        <a:ea typeface="+mn-ea"/>
+        <a:cs typeface="+mn-cs"/>
+      </a:defRPr>
+    </a:lvl3pPr>
+    <a:lvl4pPr marL="1371600" algn="l" defTabSz="914400" rtl="0" eaLnBrk="1" latinLnBrk="0" hangingPunct="1">
+      <a:defRPr sz="1200" kern="1200">
+        <a:solidFill>
+          <a:schemeClr val="tx1"/>
+        </a:solidFill>
+        <a:latin typeface="+mn-lt"/>
+        <a:ea typeface="+mn-ea"/>
+        <a:cs typeface="+mn-cs"/>
+      </a:defRPr>
+    </a:lvl4pPr>
+    <a:lvl5pPr marL="1828800" algn="l" defTabSz="914400" rtl="0" eaLnBrk="1" latinLnBrk="0" hangingPunct="1">
+      <a:defRPr sz="1200" kern="1200">
+        <a:solidFill>
+          <a:schemeClr val="tx1"/>
+        </a:solidFill>
+        <a:latin typeface="+mn-lt"/>
+        <a:ea typeface="+mn-ea"/>
+        <a:cs typeface="+mn-cs"/>
+      </a:defRPr>
+    </a:lvl5pPr>
+    <a:lvl6pPr marL="2286000" algn="l" defTabSz="914400" rtl="0" eaLnBrk="1" latinLnBrk="0" hangingPunct="1">
+      <a:defRPr sz="1200" kern="1200">
+        <a:solidFill>
+          <a:schemeClr val="tx1"/>
+        </a:solidFill>
+        <a:latin typeface="+mn-lt"/>
+        <a:ea typeface="+mn-ea"/>
+        <a:cs typeface="+mn-cs"/>
+      </a:defRPr>
+    </a:lvl6pPr>
+    <a:lvl7pPr marL="2743200" algn="l" defTabSz="914400" rtl="0" eaLnBrk="1" latinLnBrk="0" hangingPunct="1">
+      <a:defRPr sz="1200" kern="1200">
+        <a:solidFill>
+          <a:schemeClr val="tx1"/>
+        </a:solidFill>
+        <a:latin typeface="+mn-lt"/>
+        <a:ea typeface="+mn-ea"/>
+        <a:cs typeface="+mn-cs"/>
+      </a:defRPr>
+    </a:lvl7pPr>
+    <a:lvl8pPr marL="3200400" algn="l" defTabSz="914400" rtl="0" eaLnBrk="1" latinLnBrk="0" hangingPunct="1">
+      <a:defRPr sz="1200" kern="1200">
+        <a:solidFill>
+          <a:schemeClr val="tx1"/>
+        </a:solidFill>
+        <a:latin typeface="+mn-lt"/>
+        <a:ea typeface="+mn-ea"/>
+        <a:cs typeface="+mn-cs"/>
+      </a:defRPr>
+    </a:lvl8pPr>
+    <a:lvl9pPr marL="3657600" algn="l" defTabSz="914400" rtl="0" eaLnBrk="1" latinLnBrk="0" hangingPunct="1">
+      <a:defRPr sz="1200" kern="1200">
+        <a:solidFill>
+          <a:schemeClr val="tx1"/>
+        </a:solidFill>
+        <a:latin typeface="+mn-lt"/>
+        <a:ea typeface="+mn-ea"/>
+        <a:cs typeface="+mn-cs"/>
+      </a:defRPr>
+    </a:lvl9pPr>
+  </p:notesStyle>
+</p:notesMaster>
+</file>
+
+<file path=ppt/notesSlides/notesSlide1.xml><?xml version="1.0" encoding="utf-8"?>
+<p:notes xmlns:a="http://schemas.openxmlformats.org/drawingml/2006/main" xmlns:r="http://schemas.openxmlformats.org/officeDocument/2006/relationships" xmlns:p="http://schemas.openxmlformats.org/presentationml/2006/main">
+  <p:cSld>
+    <p:spTree>
+      <p:nvGrpSpPr>
+        <p:cNvPr id="1" name=""/>
+        <p:cNvGrpSpPr/>
+        <p:nvPr/>
+      </p:nvGrpSpPr>
+      <p:grpSpPr>
+        <a:xfrm>
+          <a:off x="0" y="0"/>
+          <a:ext cx="0" cy="0"/>
+          <a:chOff x="0" y="0"/>
+          <a:chExt cx="0" cy="0"/>
+        </a:xfrm>
+      </p:grpSpPr>
+      <p:sp>
+        <p:nvSpPr>
+          <p:cNvPr id="2" name="Slide Image Placeholder 1"/>
+          <p:cNvSpPr>
+            <a:spLocks noGrp="1" noRot="1" noChangeAspect="1"/>
+          </p:cNvSpPr>
+          <p:nvPr>
+            <p:ph type="sldImg"/>
+          </p:nvPr>
+        </p:nvSpPr>
+        <p:spPr/>
+      </p:sp>
+      <p:sp>
+        <p:nvSpPr>
+          <p:cNvPr id="3" name="Notes Placeholder 2"/>
+          <p:cNvSpPr>
+            <a:spLocks noGrp="1"/>
+          </p:cNvSpPr>
+          <p:nvPr>
+            <p:ph type="body" idx="1"/>
+          </p:nvPr>
+        </p:nvSpPr>
+        <p:spPr/>
+        <p:txBody>
+          <a:bodyPr>
+            <a:normAutofit/>
+          </a:bodyPr>
+          <a:lstStyle/>
+          <a:p>
+            <a:endParaRPr lang="en-CA"/>
+          </a:p>
+        </p:txBody>
+      </p:sp>
+      <p:sp>
+        <p:nvSpPr>
+          <p:cNvPr id="4" name="Slide Number Placeholder 3"/>
+          <p:cNvSpPr>
+            <a:spLocks noGrp="1"/>
+          </p:cNvSpPr>
+          <p:nvPr>
+            <p:ph type="sldNum" sz="quarter" idx="10"/>
+          </p:nvPr>
+        </p:nvSpPr>
+        <p:spPr/>
+        <p:txBody>
+          <a:bodyPr/>
+          <a:lstStyle/>
+          <a:p>
+            <a:fld id="{B566A6A9-DC25-4FD7-8930-1DCB0B360AE2}" type="slidenum">
+              <a:rPr lang="en-CA" smtClean="0"/>
+              <a:t>3</a:t>
+            </a:fld>
+            <a:endParaRPr lang="en-CA"/>
+          </a:p>
+        </p:txBody>
+      </p:sp>
+    </p:spTree>
+  </p:cSld>
+  <p:clrMapOvr>
+    <a:masterClrMapping/>
+  </p:clrMapOvr>
+</p:notes>
+</file>
+
+<file path=ppt/notesSlides/notesSlide2.xml><?xml version="1.0" encoding="utf-8"?>
+<p:notes xmlns:a="http://schemas.openxmlformats.org/drawingml/2006/main" xmlns:r="http://schemas.openxmlformats.org/officeDocument/2006/relationships" xmlns:p="http://schemas.openxmlformats.org/presentationml/2006/main">
+  <p:cSld>
+    <p:spTree>
+      <p:nvGrpSpPr>
+        <p:cNvPr id="1" name=""/>
+        <p:cNvGrpSpPr/>
+        <p:nvPr/>
+      </p:nvGrpSpPr>
+      <p:grpSpPr>
+        <a:xfrm>
+          <a:off x="0" y="0"/>
+          <a:ext cx="0" cy="0"/>
+          <a:chOff x="0" y="0"/>
+          <a:chExt cx="0" cy="0"/>
+        </a:xfrm>
+      </p:grpSpPr>
+      <p:sp>
+        <p:nvSpPr>
+          <p:cNvPr id="2" name="Slide Image Placeholder 1"/>
+          <p:cNvSpPr>
+            <a:spLocks noGrp="1" noRot="1" noChangeAspect="1"/>
+          </p:cNvSpPr>
+          <p:nvPr>
+            <p:ph type="sldImg"/>
+          </p:nvPr>
+        </p:nvSpPr>
+        <p:spPr/>
+      </p:sp>
+      <p:sp>
+        <p:nvSpPr>
+          <p:cNvPr id="3" name="Notes Placeholder 2"/>
+          <p:cNvSpPr>
+            <a:spLocks noGrp="1"/>
+          </p:cNvSpPr>
+          <p:nvPr>
+            <p:ph type="body" idx="1"/>
+          </p:nvPr>
+        </p:nvSpPr>
+        <p:spPr/>
+        <p:txBody>
+          <a:bodyPr>
+            <a:normAutofit/>
+          </a:bodyPr>
+          <a:lstStyle/>
+          <a:p>
+            <a:r>
+              <a:rPr lang="en-CA" dirty="0" smtClean="0"/>
+              <a:t>Encryption</a:t>
+            </a:r>
+          </a:p>
+          <a:p>
+            <a:r>
+              <a:rPr lang="en-CA" dirty="0" smtClean="0"/>
+              <a:t>Best case scenario for VPN because there was no background traffic</a:t>
+            </a:r>
+            <a:endParaRPr lang="en-CA" dirty="0"/>
+          </a:p>
+        </p:txBody>
+      </p:sp>
+      <p:sp>
+        <p:nvSpPr>
+          <p:cNvPr id="4" name="Slide Number Placeholder 3"/>
+          <p:cNvSpPr>
+            <a:spLocks noGrp="1"/>
+          </p:cNvSpPr>
+          <p:nvPr>
+            <p:ph type="sldNum" sz="quarter" idx="10"/>
+          </p:nvPr>
+        </p:nvSpPr>
+        <p:spPr/>
+        <p:txBody>
+          <a:bodyPr/>
+          <a:lstStyle/>
+          <a:p>
+            <a:fld id="{B566A6A9-DC25-4FD7-8930-1DCB0B360AE2}" type="slidenum">
+              <a:rPr lang="en-CA" smtClean="0"/>
+              <a:t>14</a:t>
+            </a:fld>
+            <a:endParaRPr lang="en-CA"/>
+          </a:p>
+        </p:txBody>
+      </p:sp>
+    </p:spTree>
+  </p:cSld>
+  <p:clrMapOvr>
+    <a:masterClrMapping/>
+  </p:clrMapOvr>
+</p:notes>
+</file>
+
+<file path=ppt/notesSlides/notesSlide3.xml><?xml version="1.0" encoding="utf-8"?>
+<p:notes xmlns:a="http://schemas.openxmlformats.org/drawingml/2006/main" xmlns:r="http://schemas.openxmlformats.org/officeDocument/2006/relationships" xmlns:p="http://schemas.openxmlformats.org/presentationml/2006/main">
+  <p:cSld>
+    <p:spTree>
+      <p:nvGrpSpPr>
+        <p:cNvPr id="1" name=""/>
+        <p:cNvGrpSpPr/>
+        <p:nvPr/>
+      </p:nvGrpSpPr>
+      <p:grpSpPr>
+        <a:xfrm>
+          <a:off x="0" y="0"/>
+          <a:ext cx="0" cy="0"/>
+          <a:chOff x="0" y="0"/>
+          <a:chExt cx="0" cy="0"/>
+        </a:xfrm>
+      </p:grpSpPr>
+      <p:sp>
+        <p:nvSpPr>
+          <p:cNvPr id="2" name="Slide Image Placeholder 1"/>
+          <p:cNvSpPr>
+            <a:spLocks noGrp="1" noRot="1" noChangeAspect="1"/>
+          </p:cNvSpPr>
+          <p:nvPr>
+            <p:ph type="sldImg"/>
+          </p:nvPr>
+        </p:nvSpPr>
+        <p:spPr/>
+      </p:sp>
+      <p:sp>
+        <p:nvSpPr>
+          <p:cNvPr id="3" name="Notes Placeholder 2"/>
+          <p:cNvSpPr>
+            <a:spLocks noGrp="1"/>
+          </p:cNvSpPr>
+          <p:nvPr>
+            <p:ph type="body" idx="1"/>
+          </p:nvPr>
+        </p:nvSpPr>
+        <p:spPr/>
+        <p:txBody>
+          <a:bodyPr>
+            <a:normAutofit/>
+          </a:bodyPr>
+          <a:lstStyle/>
+          <a:p>
+            <a:r>
+              <a:rPr lang="en-CA" dirty="0" smtClean="0"/>
+              <a:t>Firewall on the client segment to block certain types of traffic</a:t>
+            </a:r>
+            <a:r>
+              <a:rPr lang="en-CA" baseline="0" dirty="0" smtClean="0"/>
+              <a:t> such as http video</a:t>
+            </a:r>
+          </a:p>
+          <a:p>
+            <a:r>
+              <a:rPr lang="en-CA" baseline="0" dirty="0" smtClean="0"/>
+              <a:t>Official segment is unlikely to scale once the </a:t>
+            </a:r>
+            <a:r>
+              <a:rPr lang="en-CA" baseline="0" dirty="0" err="1" smtClean="0"/>
+              <a:t>infastructure</a:t>
+            </a:r>
+            <a:r>
+              <a:rPr lang="en-CA" baseline="0" dirty="0" smtClean="0"/>
+              <a:t> is set up, VPN provides both encryption and compression</a:t>
+            </a:r>
+            <a:endParaRPr lang="en-CA" dirty="0"/>
+          </a:p>
+        </p:txBody>
+      </p:sp>
+      <p:sp>
+        <p:nvSpPr>
+          <p:cNvPr id="4" name="Slide Number Placeholder 3"/>
+          <p:cNvSpPr>
+            <a:spLocks noGrp="1"/>
+          </p:cNvSpPr>
+          <p:nvPr>
+            <p:ph type="sldNum" sz="quarter" idx="10"/>
+          </p:nvPr>
+        </p:nvSpPr>
+        <p:spPr/>
+        <p:txBody>
+          <a:bodyPr/>
+          <a:lstStyle/>
+          <a:p>
+            <a:fld id="{B566A6A9-DC25-4FD7-8930-1DCB0B360AE2}" type="slidenum">
+              <a:rPr lang="en-CA" smtClean="0"/>
+              <a:t>15</a:t>
+            </a:fld>
+            <a:endParaRPr lang="en-CA"/>
+          </a:p>
+        </p:txBody>
+      </p:sp>
+    </p:spTree>
+  </p:cSld>
+  <p:clrMapOvr>
+    <a:masterClrMapping/>
+  </p:clrMapOvr>
+</p:notes>
+</file>
+
+<file path=ppt/notesSlides/notesSlide4.xml><?xml version="1.0" encoding="utf-8"?>
+<p:notes xmlns:a="http://schemas.openxmlformats.org/drawingml/2006/main" xmlns:r="http://schemas.openxmlformats.org/officeDocument/2006/relationships" xmlns:p="http://schemas.openxmlformats.org/presentationml/2006/main">
+  <p:cSld>
+    <p:spTree>
+      <p:nvGrpSpPr>
+        <p:cNvPr id="1" name=""/>
+        <p:cNvGrpSpPr/>
+        <p:nvPr/>
+      </p:nvGrpSpPr>
+      <p:grpSpPr>
+        <a:xfrm>
+          <a:off x="0" y="0"/>
+          <a:ext cx="0" cy="0"/>
+          <a:chOff x="0" y="0"/>
+          <a:chExt cx="0" cy="0"/>
+        </a:xfrm>
+      </p:grpSpPr>
+      <p:sp>
+        <p:nvSpPr>
+          <p:cNvPr id="2" name="Slide Image Placeholder 1"/>
+          <p:cNvSpPr>
+            <a:spLocks noGrp="1" noRot="1" noChangeAspect="1"/>
+          </p:cNvSpPr>
+          <p:nvPr>
+            <p:ph type="sldImg"/>
+          </p:nvPr>
+        </p:nvSpPr>
+        <p:spPr/>
+      </p:sp>
+      <p:sp>
+        <p:nvSpPr>
+          <p:cNvPr id="3" name="Notes Placeholder 2"/>
+          <p:cNvSpPr>
+            <a:spLocks noGrp="1"/>
+          </p:cNvSpPr>
+          <p:nvPr>
+            <p:ph type="body" idx="1"/>
+          </p:nvPr>
+        </p:nvSpPr>
+        <p:spPr/>
+        <p:txBody>
+          <a:bodyPr>
+            <a:normAutofit/>
+          </a:bodyPr>
+          <a:lstStyle/>
+          <a:p>
+            <a:r>
+              <a:rPr lang="en-CA" dirty="0" smtClean="0"/>
+              <a:t>-Based</a:t>
+            </a:r>
+            <a:r>
+              <a:rPr lang="en-CA" baseline="0" dirty="0" smtClean="0"/>
+              <a:t> on results alone, I would recommend a VPN firewall implementation because it provided the quickest results for both HTTP and DB traffic</a:t>
+            </a:r>
+          </a:p>
+          <a:p>
+            <a:r>
+              <a:rPr lang="en-CA" baseline="0" dirty="0" smtClean="0"/>
+              <a:t>-Based on real world situation with cost limitations and background traffic </a:t>
+            </a:r>
+            <a:endParaRPr lang="en-CA" dirty="0"/>
+          </a:p>
+        </p:txBody>
+      </p:sp>
+      <p:sp>
+        <p:nvSpPr>
+          <p:cNvPr id="4" name="Slide Number Placeholder 3"/>
+          <p:cNvSpPr>
+            <a:spLocks noGrp="1"/>
+          </p:cNvSpPr>
+          <p:nvPr>
+            <p:ph type="sldNum" sz="quarter" idx="10"/>
+          </p:nvPr>
+        </p:nvSpPr>
+        <p:spPr/>
+        <p:txBody>
+          <a:bodyPr/>
+          <a:lstStyle/>
+          <a:p>
+            <a:fld id="{B566A6A9-DC25-4FD7-8930-1DCB0B360AE2}" type="slidenum">
+              <a:rPr lang="en-CA" smtClean="0"/>
+              <a:t>16</a:t>
+            </a:fld>
+            <a:endParaRPr lang="en-CA"/>
+          </a:p>
+        </p:txBody>
+      </p:sp>
+    </p:spTree>
+  </p:cSld>
+  <p:clrMapOvr>
+    <a:masterClrMapping/>
+  </p:clrMapOvr>
+</p:notes>
+</file>
+
 <file path=ppt/slideLayouts/slideLayout1.xml><?xml version="1.0" encoding="utf-8"?>
 <p:sldLayout xmlns:a="http://schemas.openxmlformats.org/drawingml/2006/main" xmlns:r="http://schemas.openxmlformats.org/officeDocument/2006/relationships" xmlns:p="http://schemas.openxmlformats.org/presentationml/2006/main" type="title" preserve="1">
   <p:cSld name="Title Slide">
@@ -345,7 +1080,8 @@
           <a:p>
             <a:fld id="{2069C06D-4ED8-42C6-905D-CA84CA1B6CBF}" type="datetime2">
               <a:rPr lang="en-US" smtClean="0"/>
-              <a:t>Monday, June 2, 14</a:t>
+              <a:pPr/>
+              <a:t>Tuesday, June 3, 2014</a:t>
             </a:fld>
             <a:endParaRPr lang="en-US" dirty="0"/>
           </a:p>
@@ -516,7 +1252,8 @@
           <a:p>
             <a:fld id="{A56EEE0E-EDB0-4D84-86B0-50833DF22902}" type="datetime2">
               <a:rPr lang="en-US" smtClean="0"/>
-              <a:t>Monday, June 2, 14</a:t>
+              <a:pPr/>
+              <a:t>Tuesday, June 3, 2014</a:t>
             </a:fld>
             <a:endParaRPr lang="en-US"/>
           </a:p>
@@ -692,7 +1429,8 @@
           <a:p>
             <a:fld id="{5114372C-B5AB-4C39-B273-B99224EB4DD5}" type="datetime2">
               <a:rPr lang="en-US" smtClean="0"/>
-              <a:t>Monday, June 2, 14</a:t>
+              <a:pPr/>
+              <a:t>Tuesday, June 3, 2014</a:t>
             </a:fld>
             <a:endParaRPr lang="en-US"/>
           </a:p>
@@ -858,7 +1596,8 @@
           <a:p>
             <a:fld id="{14CB1CAA-32CD-4B55-B92A-B8F0843CACF4}" type="datetime2">
               <a:rPr lang="en-US" smtClean="0"/>
-              <a:t>Monday, June 2, 14</a:t>
+              <a:pPr/>
+              <a:t>Tuesday, June 3, 2014</a:t>
             </a:fld>
             <a:endParaRPr lang="en-US" dirty="0"/>
           </a:p>
@@ -1116,7 +1855,8 @@
           <a:p>
             <a:fld id="{3AD8CDC4-3D19-4983-B478-82F6B8E5AB66}" type="datetime2">
               <a:rPr lang="en-US" smtClean="0"/>
-              <a:t>Monday, June 2, 14</a:t>
+              <a:pPr/>
+              <a:t>Tuesday, June 3, 2014</a:t>
             </a:fld>
             <a:endParaRPr lang="en-US" dirty="0"/>
           </a:p>
@@ -1257,7 +1997,8 @@
           <a:p>
             <a:fld id="{84B82477-D5D3-4181-8C11-75D0F2433A87}" type="datetime2">
               <a:rPr lang="en-US" smtClean="0"/>
-              <a:t>Monday, June 2, 14</a:t>
+              <a:pPr/>
+              <a:t>Tuesday, June 3, 2014</a:t>
             </a:fld>
             <a:endParaRPr lang="en-US" dirty="0"/>
           </a:p>
@@ -1908,7 +2649,8 @@
           <a:p>
             <a:fld id="{213E253B-1893-4367-8BAE-DF4BC10DC578}" type="datetime2">
               <a:rPr lang="en-US" smtClean="0"/>
-              <a:t>Monday, June 2, 14</a:t>
+              <a:pPr/>
+              <a:t>Tuesday, June 3, 2014</a:t>
             </a:fld>
             <a:endParaRPr lang="en-US" dirty="0"/>
           </a:p>
@@ -2022,7 +2764,8 @@
           <a:p>
             <a:fld id="{8B62300D-25B3-4603-86C9-4CB776489F00}" type="datetime2">
               <a:rPr lang="en-US" smtClean="0"/>
-              <a:t>Monday, June 2, 14</a:t>
+              <a:pPr/>
+              <a:t>Tuesday, June 3, 2014</a:t>
             </a:fld>
             <a:endParaRPr lang="en-US" dirty="0"/>
           </a:p>
@@ -2113,7 +2856,8 @@
           <a:p>
             <a:fld id="{C6314AD9-FCC8-48B7-B85B-012A91320DFF}" type="datetime2">
               <a:rPr lang="en-US" smtClean="0"/>
-              <a:t>Monday, June 2, 14</a:t>
+              <a:pPr/>
+              <a:t>Tuesday, June 3, 2014</a:t>
             </a:fld>
             <a:endParaRPr lang="en-US" dirty="0"/>
           </a:p>
@@ -2404,7 +3148,8 @@
           <a:p>
             <a:fld id="{3182DC50-D5DB-4F94-B367-9876CD2C4012}" type="datetime2">
               <a:rPr lang="en-US" smtClean="0"/>
-              <a:t>Monday, June 2, 14</a:t>
+              <a:pPr/>
+              <a:t>Tuesday, June 3, 2014</a:t>
             </a:fld>
             <a:endParaRPr lang="en-US" dirty="0"/>
           </a:p>
@@ -2728,7 +3473,8 @@
           <a:p>
             <a:fld id="{292EB412-E790-42EA-81FE-2925D3A43D91}" type="datetime2">
               <a:rPr lang="en-US" smtClean="0"/>
-              <a:t>Monday, June 2, 14</a:t>
+              <a:pPr/>
+              <a:t>Tuesday, June 3, 2014</a:t>
             </a:fld>
             <a:endParaRPr lang="en-US" dirty="0"/>
           </a:p>
@@ -3186,7 +3932,8 @@
           <a:p>
             <a:fld id="{0B385921-A91A-409C-921C-0E0EC1E750EC}" type="datetime2">
               <a:rPr lang="en-US" smtClean="0"/>
-              <a:t>Monday, June 2, 14</a:t>
+              <a:pPr/>
+              <a:t>Tuesday, June 3, 2014</a:t>
             </a:fld>
             <a:endParaRPr lang="en-US" dirty="0"/>
           </a:p>
@@ -3715,7 +4462,11 @@
           <a:p>
             <a:r>
               <a:rPr lang="en-US" dirty="0" smtClean="0"/>
-              <a:t>Assignment 2: Results</a:t>
+              <a:t>Assignment 2: </a:t>
+            </a:r>
+            <a:r>
+              <a:rPr lang="en-US" dirty="0" smtClean="0"/>
+              <a:t>Results in a nutshell</a:t>
             </a:r>
             <a:endParaRPr lang="en-US" dirty="0"/>
           </a:p>
@@ -3747,7 +4498,7 @@
     </p:spTree>
     <p:extLst>
       <p:ext uri="{BB962C8B-B14F-4D97-AF65-F5344CB8AC3E}">
-        <p14:creationId xmlns:p14="http://schemas.microsoft.com/office/powerpoint/2010/main" val="287476967"/>
+        <p14:creationId xmlns:p14="http://schemas.microsoft.com/office/powerpoint/2010/main" xmlns="" val="287476967"/>
       </p:ext>
     </p:extLst>
   </p:cSld>
@@ -3757,10 +4508,665 @@
   <p:timing>
     <p:tnLst>
       <p:par>
-        <p:cTn xmlns:p14="http://schemas.microsoft.com/office/powerpoint/2010/main" id="1" dur="indefinite" restart="never" nodeType="tmRoot"/>
+        <p:cTn id="1" dur="indefinite" restart="never" nodeType="tmRoot"/>
       </p:par>
     </p:tnLst>
   </p:timing>
+</p:sld>
+</file>
+
+<file path=ppt/slides/slide10.xml><?xml version="1.0" encoding="utf-8"?>
+<p:sld xmlns:a="http://schemas.openxmlformats.org/drawingml/2006/main" xmlns:r="http://schemas.openxmlformats.org/officeDocument/2006/relationships" xmlns:p="http://schemas.openxmlformats.org/presentationml/2006/main">
+  <p:cSld>
+    <p:spTree>
+      <p:nvGrpSpPr>
+        <p:cNvPr id="1" name=""/>
+        <p:cNvGrpSpPr/>
+        <p:nvPr/>
+      </p:nvGrpSpPr>
+      <p:grpSpPr>
+        <a:xfrm>
+          <a:off x="0" y="0"/>
+          <a:ext cx="0" cy="0"/>
+          <a:chOff x="0" y="0"/>
+          <a:chExt cx="0" cy="0"/>
+        </a:xfrm>
+      </p:grpSpPr>
+      <p:sp>
+        <p:nvSpPr>
+          <p:cNvPr id="3" name="Title 2"/>
+          <p:cNvSpPr>
+            <a:spLocks noGrp="1"/>
+          </p:cNvSpPr>
+          <p:nvPr>
+            <p:ph type="title"/>
+          </p:nvPr>
+        </p:nvSpPr>
+        <p:spPr>
+          <a:xfrm>
+            <a:off x="777240" y="5310130"/>
+            <a:ext cx="7543800" cy="914400"/>
+          </a:xfrm>
+        </p:spPr>
+        <p:txBody>
+          <a:bodyPr/>
+          <a:lstStyle/>
+          <a:p>
+            <a:r>
+              <a:rPr lang="en-CA" dirty="0" smtClean="0"/>
+              <a:t>DB – Query Response Time</a:t>
+            </a:r>
+            <a:endParaRPr lang="en-CA" dirty="0"/>
+          </a:p>
+        </p:txBody>
+      </p:sp>
+      <p:pic>
+        <p:nvPicPr>
+          <p:cNvPr id="4" name="Content Placeholder 3"/>
+          <p:cNvPicPr>
+            <a:picLocks noGrp="1"/>
+          </p:cNvPicPr>
+          <p:nvPr>
+            <p:ph idx="1"/>
+          </p:nvPr>
+        </p:nvPicPr>
+        <p:blipFill>
+          <a:blip r:embed="rId2" cstate="print"/>
+          <a:srcRect/>
+          <a:stretch>
+            <a:fillRect/>
+          </a:stretch>
+        </p:blipFill>
+        <p:spPr bwMode="auto">
+          <a:xfrm>
+            <a:off x="777240" y="352540"/>
+            <a:ext cx="7543800" cy="4263528"/>
+          </a:xfrm>
+          <a:prstGeom prst="rect">
+            <a:avLst/>
+          </a:prstGeom>
+          <a:noFill/>
+          <a:ln w="9525">
+            <a:noFill/>
+            <a:miter lim="800000"/>
+            <a:headEnd/>
+            <a:tailEnd/>
+          </a:ln>
+        </p:spPr>
+      </p:pic>
+    </p:spTree>
+  </p:cSld>
+  <p:clrMapOvr>
+    <a:masterClrMapping/>
+  </p:clrMapOvr>
+</p:sld>
+</file>
+
+<file path=ppt/slides/slide11.xml><?xml version="1.0" encoding="utf-8"?>
+<p:sld xmlns:a="http://schemas.openxmlformats.org/drawingml/2006/main" xmlns:r="http://schemas.openxmlformats.org/officeDocument/2006/relationships" xmlns:p="http://schemas.openxmlformats.org/presentationml/2006/main">
+  <p:cSld>
+    <p:spTree>
+      <p:nvGrpSpPr>
+        <p:cNvPr id="1" name=""/>
+        <p:cNvGrpSpPr/>
+        <p:nvPr/>
+      </p:nvGrpSpPr>
+      <p:grpSpPr>
+        <a:xfrm>
+          <a:off x="0" y="0"/>
+          <a:ext cx="0" cy="0"/>
+          <a:chOff x="0" y="0"/>
+          <a:chExt cx="0" cy="0"/>
+        </a:xfrm>
+      </p:grpSpPr>
+      <p:sp>
+        <p:nvSpPr>
+          <p:cNvPr id="3" name="Title 2"/>
+          <p:cNvSpPr>
+            <a:spLocks noGrp="1"/>
+          </p:cNvSpPr>
+          <p:nvPr>
+            <p:ph type="title"/>
+          </p:nvPr>
+        </p:nvSpPr>
+        <p:spPr/>
+        <p:txBody>
+          <a:bodyPr/>
+          <a:lstStyle/>
+          <a:p>
+            <a:r>
+              <a:rPr lang="en-CA" dirty="0" smtClean="0"/>
+              <a:t>HTTP – Packets Sent</a:t>
+            </a:r>
+            <a:endParaRPr lang="en-CA" dirty="0"/>
+          </a:p>
+        </p:txBody>
+      </p:sp>
+      <p:pic>
+        <p:nvPicPr>
+          <p:cNvPr id="4" name="Content Placeholder 3"/>
+          <p:cNvPicPr>
+            <a:picLocks noGrp="1"/>
+          </p:cNvPicPr>
+          <p:nvPr>
+            <p:ph idx="1"/>
+          </p:nvPr>
+        </p:nvPicPr>
+        <p:blipFill>
+          <a:blip r:embed="rId2" cstate="print"/>
+          <a:srcRect/>
+          <a:stretch>
+            <a:fillRect/>
+          </a:stretch>
+        </p:blipFill>
+        <p:spPr bwMode="auto">
+          <a:xfrm>
+            <a:off x="293783" y="256385"/>
+            <a:ext cx="8475644" cy="4620415"/>
+          </a:xfrm>
+          <a:prstGeom prst="rect">
+            <a:avLst/>
+          </a:prstGeom>
+          <a:noFill/>
+          <a:ln w="9525">
+            <a:noFill/>
+            <a:miter lim="800000"/>
+            <a:headEnd/>
+            <a:tailEnd/>
+          </a:ln>
+        </p:spPr>
+      </p:pic>
+    </p:spTree>
+  </p:cSld>
+  <p:clrMapOvr>
+    <a:masterClrMapping/>
+  </p:clrMapOvr>
+</p:sld>
+</file>
+
+<file path=ppt/slides/slide12.xml><?xml version="1.0" encoding="utf-8"?>
+<p:sld xmlns:a="http://schemas.openxmlformats.org/drawingml/2006/main" xmlns:r="http://schemas.openxmlformats.org/officeDocument/2006/relationships" xmlns:p="http://schemas.openxmlformats.org/presentationml/2006/main">
+  <p:cSld>
+    <p:spTree>
+      <p:nvGrpSpPr>
+        <p:cNvPr id="1" name=""/>
+        <p:cNvGrpSpPr/>
+        <p:nvPr/>
+      </p:nvGrpSpPr>
+      <p:grpSpPr>
+        <a:xfrm>
+          <a:off x="0" y="0"/>
+          <a:ext cx="0" cy="0"/>
+          <a:chOff x="0" y="0"/>
+          <a:chExt cx="0" cy="0"/>
+        </a:xfrm>
+      </p:grpSpPr>
+      <p:sp>
+        <p:nvSpPr>
+          <p:cNvPr id="3" name="Title 2"/>
+          <p:cNvSpPr>
+            <a:spLocks noGrp="1"/>
+          </p:cNvSpPr>
+          <p:nvPr>
+            <p:ph type="title"/>
+          </p:nvPr>
+        </p:nvSpPr>
+        <p:spPr/>
+        <p:txBody>
+          <a:bodyPr/>
+          <a:lstStyle/>
+          <a:p>
+            <a:r>
+              <a:rPr lang="en-CA" dirty="0" smtClean="0"/>
+              <a:t>HTTP – Packets Received</a:t>
+            </a:r>
+            <a:endParaRPr lang="en-CA" dirty="0"/>
+          </a:p>
+        </p:txBody>
+      </p:sp>
+      <p:pic>
+        <p:nvPicPr>
+          <p:cNvPr id="4" name="Content Placeholder 3"/>
+          <p:cNvPicPr>
+            <a:picLocks noGrp="1"/>
+          </p:cNvPicPr>
+          <p:nvPr>
+            <p:ph idx="1"/>
+          </p:nvPr>
+        </p:nvPicPr>
+        <p:blipFill>
+          <a:blip r:embed="rId2" cstate="print"/>
+          <a:srcRect/>
+          <a:stretch>
+            <a:fillRect/>
+          </a:stretch>
+        </p:blipFill>
+        <p:spPr bwMode="auto">
+          <a:xfrm>
+            <a:off x="172597" y="152300"/>
+            <a:ext cx="8651914" cy="4507835"/>
+          </a:xfrm>
+          <a:prstGeom prst="rect">
+            <a:avLst/>
+          </a:prstGeom>
+          <a:noFill/>
+          <a:ln w="9525">
+            <a:noFill/>
+            <a:miter lim="800000"/>
+            <a:headEnd/>
+            <a:tailEnd/>
+          </a:ln>
+        </p:spPr>
+      </p:pic>
+    </p:spTree>
+  </p:cSld>
+  <p:clrMapOvr>
+    <a:masterClrMapping/>
+  </p:clrMapOvr>
+</p:sld>
+</file>
+
+<file path=ppt/slides/slide13.xml><?xml version="1.0" encoding="utf-8"?>
+<p:sld xmlns:a="http://schemas.openxmlformats.org/drawingml/2006/main" xmlns:r="http://schemas.openxmlformats.org/officeDocument/2006/relationships" xmlns:p="http://schemas.openxmlformats.org/presentationml/2006/main">
+  <p:cSld>
+    <p:spTree>
+      <p:nvGrpSpPr>
+        <p:cNvPr id="1" name=""/>
+        <p:cNvGrpSpPr/>
+        <p:nvPr/>
+      </p:nvGrpSpPr>
+      <p:grpSpPr>
+        <a:xfrm>
+          <a:off x="0" y="0"/>
+          <a:ext cx="0" cy="0"/>
+          <a:chOff x="0" y="0"/>
+          <a:chExt cx="0" cy="0"/>
+        </a:xfrm>
+      </p:grpSpPr>
+      <p:sp>
+        <p:nvSpPr>
+          <p:cNvPr id="3" name="Title 2"/>
+          <p:cNvSpPr>
+            <a:spLocks noGrp="1"/>
+          </p:cNvSpPr>
+          <p:nvPr>
+            <p:ph type="title"/>
+          </p:nvPr>
+        </p:nvSpPr>
+        <p:spPr/>
+        <p:txBody>
+          <a:bodyPr/>
+          <a:lstStyle/>
+          <a:p>
+            <a:r>
+              <a:rPr lang="en-CA" dirty="0" smtClean="0"/>
+              <a:t>HTTP – Response Time</a:t>
+            </a:r>
+            <a:endParaRPr lang="en-CA" dirty="0"/>
+          </a:p>
+        </p:txBody>
+      </p:sp>
+      <p:pic>
+        <p:nvPicPr>
+          <p:cNvPr id="4" name="Content Placeholder 3"/>
+          <p:cNvPicPr>
+            <a:picLocks noGrp="1"/>
+          </p:cNvPicPr>
+          <p:nvPr>
+            <p:ph idx="1"/>
+          </p:nvPr>
+        </p:nvPicPr>
+        <p:blipFill>
+          <a:blip r:embed="rId2" cstate="print"/>
+          <a:srcRect/>
+          <a:stretch>
+            <a:fillRect/>
+          </a:stretch>
+        </p:blipFill>
+        <p:spPr bwMode="auto">
+          <a:xfrm>
+            <a:off x="216664" y="152463"/>
+            <a:ext cx="8596829" cy="4573773"/>
+          </a:xfrm>
+          <a:prstGeom prst="rect">
+            <a:avLst/>
+          </a:prstGeom>
+          <a:noFill/>
+          <a:ln w="9525">
+            <a:noFill/>
+            <a:miter lim="800000"/>
+            <a:headEnd/>
+            <a:tailEnd/>
+          </a:ln>
+        </p:spPr>
+      </p:pic>
+    </p:spTree>
+  </p:cSld>
+  <p:clrMapOvr>
+    <a:masterClrMapping/>
+  </p:clrMapOvr>
+</p:sld>
+</file>
+
+<file path=ppt/slides/slide14.xml><?xml version="1.0" encoding="utf-8"?>
+<p:sld xmlns:a="http://schemas.openxmlformats.org/drawingml/2006/main" xmlns:r="http://schemas.openxmlformats.org/officeDocument/2006/relationships" xmlns:p="http://schemas.openxmlformats.org/presentationml/2006/main">
+  <p:cSld>
+    <p:spTree>
+      <p:nvGrpSpPr>
+        <p:cNvPr id="1" name=""/>
+        <p:cNvGrpSpPr/>
+        <p:nvPr/>
+      </p:nvGrpSpPr>
+      <p:grpSpPr>
+        <a:xfrm>
+          <a:off x="0" y="0"/>
+          <a:ext cx="0" cy="0"/>
+          <a:chOff x="0" y="0"/>
+          <a:chExt cx="0" cy="0"/>
+        </a:xfrm>
+      </p:grpSpPr>
+      <p:sp>
+        <p:nvSpPr>
+          <p:cNvPr id="2" name="Content Placeholder 1"/>
+          <p:cNvSpPr>
+            <a:spLocks noGrp="1"/>
+          </p:cNvSpPr>
+          <p:nvPr>
+            <p:ph idx="1"/>
+          </p:nvPr>
+        </p:nvSpPr>
+        <p:spPr/>
+        <p:txBody>
+          <a:bodyPr/>
+          <a:lstStyle/>
+          <a:p>
+            <a:r>
+              <a:rPr lang="en-CA" dirty="0" smtClean="0"/>
+              <a:t>Simulation </a:t>
+            </a:r>
+            <a:r>
+              <a:rPr lang="en-CA" dirty="0" err="1" smtClean="0"/>
+              <a:t>vs</a:t>
+            </a:r>
+            <a:r>
+              <a:rPr lang="en-CA" dirty="0" smtClean="0"/>
+              <a:t> real world</a:t>
+            </a:r>
+          </a:p>
+          <a:p>
+            <a:r>
+              <a:rPr lang="en-CA" dirty="0" smtClean="0"/>
+              <a:t>Best case scenario</a:t>
+            </a:r>
+            <a:endParaRPr lang="en-CA" dirty="0"/>
+          </a:p>
+        </p:txBody>
+      </p:sp>
+      <p:sp>
+        <p:nvSpPr>
+          <p:cNvPr id="3" name="Title 2"/>
+          <p:cNvSpPr>
+            <a:spLocks noGrp="1"/>
+          </p:cNvSpPr>
+          <p:nvPr>
+            <p:ph type="title"/>
+          </p:nvPr>
+        </p:nvSpPr>
+        <p:spPr/>
+        <p:txBody>
+          <a:bodyPr/>
+          <a:lstStyle/>
+          <a:p>
+            <a:r>
+              <a:rPr lang="en-CA" dirty="0" smtClean="0"/>
+              <a:t>Limitations</a:t>
+            </a:r>
+            <a:endParaRPr lang="en-CA" dirty="0"/>
+          </a:p>
+        </p:txBody>
+      </p:sp>
+    </p:spTree>
+  </p:cSld>
+  <p:clrMapOvr>
+    <a:masterClrMapping/>
+  </p:clrMapOvr>
+</p:sld>
+</file>
+
+<file path=ppt/slides/slide15.xml><?xml version="1.0" encoding="utf-8"?>
+<p:sld xmlns:a="http://schemas.openxmlformats.org/drawingml/2006/main" xmlns:r="http://schemas.openxmlformats.org/officeDocument/2006/relationships" xmlns:p="http://schemas.openxmlformats.org/presentationml/2006/main">
+  <p:cSld>
+    <p:spTree>
+      <p:nvGrpSpPr>
+        <p:cNvPr id="1" name=""/>
+        <p:cNvGrpSpPr/>
+        <p:nvPr/>
+      </p:nvGrpSpPr>
+      <p:grpSpPr>
+        <a:xfrm>
+          <a:off x="0" y="0"/>
+          <a:ext cx="0" cy="0"/>
+          <a:chOff x="0" y="0"/>
+          <a:chExt cx="0" cy="0"/>
+        </a:xfrm>
+      </p:grpSpPr>
+      <p:sp>
+        <p:nvSpPr>
+          <p:cNvPr id="2" name="Content Placeholder 1"/>
+          <p:cNvSpPr>
+            <a:spLocks noGrp="1"/>
+          </p:cNvSpPr>
+          <p:nvPr>
+            <p:ph idx="1"/>
+          </p:nvPr>
+        </p:nvSpPr>
+        <p:spPr/>
+        <p:txBody>
+          <a:bodyPr/>
+          <a:lstStyle/>
+          <a:p>
+            <a:r>
+              <a:rPr lang="en-CA" dirty="0" smtClean="0"/>
+              <a:t>Client segment implements a firewall</a:t>
+            </a:r>
+          </a:p>
+          <a:p>
+            <a:r>
+              <a:rPr lang="en-CA" dirty="0" smtClean="0"/>
+              <a:t>Official segment implements VPN</a:t>
+            </a:r>
+            <a:endParaRPr lang="en-CA" dirty="0"/>
+          </a:p>
+        </p:txBody>
+      </p:sp>
+      <p:sp>
+        <p:nvSpPr>
+          <p:cNvPr id="3" name="Title 2"/>
+          <p:cNvSpPr>
+            <a:spLocks noGrp="1"/>
+          </p:cNvSpPr>
+          <p:nvPr>
+            <p:ph type="title"/>
+          </p:nvPr>
+        </p:nvSpPr>
+        <p:spPr/>
+        <p:txBody>
+          <a:bodyPr/>
+          <a:lstStyle/>
+          <a:p>
+            <a:r>
+              <a:rPr lang="en-CA" dirty="0" smtClean="0"/>
+              <a:t>Recommendations</a:t>
+            </a:r>
+            <a:endParaRPr lang="en-CA" dirty="0"/>
+          </a:p>
+        </p:txBody>
+      </p:sp>
+    </p:spTree>
+  </p:cSld>
+  <p:clrMapOvr>
+    <a:masterClrMapping/>
+  </p:clrMapOvr>
+</p:sld>
+</file>
+
+<file path=ppt/slides/slide16.xml><?xml version="1.0" encoding="utf-8"?>
+<p:sld xmlns:a="http://schemas.openxmlformats.org/drawingml/2006/main" xmlns:r="http://schemas.openxmlformats.org/officeDocument/2006/relationships" xmlns:p="http://schemas.openxmlformats.org/presentationml/2006/main">
+  <p:cSld>
+    <p:spTree>
+      <p:nvGrpSpPr>
+        <p:cNvPr id="1" name=""/>
+        <p:cNvGrpSpPr/>
+        <p:nvPr/>
+      </p:nvGrpSpPr>
+      <p:grpSpPr>
+        <a:xfrm>
+          <a:off x="0" y="0"/>
+          <a:ext cx="0" cy="0"/>
+          <a:chOff x="0" y="0"/>
+          <a:chExt cx="0" cy="0"/>
+        </a:xfrm>
+      </p:grpSpPr>
+      <p:sp>
+        <p:nvSpPr>
+          <p:cNvPr id="2" name="Content Placeholder 1"/>
+          <p:cNvSpPr>
+            <a:spLocks noGrp="1"/>
+          </p:cNvSpPr>
+          <p:nvPr>
+            <p:ph idx="1"/>
+          </p:nvPr>
+        </p:nvSpPr>
+        <p:spPr/>
+        <p:txBody>
+          <a:bodyPr/>
+          <a:lstStyle/>
+          <a:p>
+            <a:endParaRPr lang="en-CA"/>
+          </a:p>
+        </p:txBody>
+      </p:sp>
+      <p:sp>
+        <p:nvSpPr>
+          <p:cNvPr id="3" name="Title 2"/>
+          <p:cNvSpPr>
+            <a:spLocks noGrp="1"/>
+          </p:cNvSpPr>
+          <p:nvPr>
+            <p:ph type="title"/>
+          </p:nvPr>
+        </p:nvSpPr>
+        <p:spPr/>
+        <p:txBody>
+          <a:bodyPr/>
+          <a:lstStyle/>
+          <a:p>
+            <a:r>
+              <a:rPr lang="en-CA" dirty="0" smtClean="0"/>
+              <a:t>Conclusion</a:t>
+            </a:r>
+            <a:endParaRPr lang="en-CA" dirty="0"/>
+          </a:p>
+        </p:txBody>
+      </p:sp>
+    </p:spTree>
+  </p:cSld>
+  <p:clrMapOvr>
+    <a:masterClrMapping/>
+  </p:clrMapOvr>
+</p:sld>
+</file>
+
+<file path=ppt/slides/slide17.xml><?xml version="1.0" encoding="utf-8"?>
+<p:sld xmlns:a="http://schemas.openxmlformats.org/drawingml/2006/main" xmlns:r="http://schemas.openxmlformats.org/officeDocument/2006/relationships" xmlns:p="http://schemas.openxmlformats.org/presentationml/2006/main">
+  <p:cSld>
+    <p:spTree>
+      <p:nvGrpSpPr>
+        <p:cNvPr id="1" name=""/>
+        <p:cNvGrpSpPr/>
+        <p:nvPr/>
+      </p:nvGrpSpPr>
+      <p:grpSpPr>
+        <a:xfrm>
+          <a:off x="0" y="0"/>
+          <a:ext cx="0" cy="0"/>
+          <a:chOff x="0" y="0"/>
+          <a:chExt cx="0" cy="0"/>
+        </a:xfrm>
+      </p:grpSpPr>
+      <p:sp>
+        <p:nvSpPr>
+          <p:cNvPr id="2" name="Content Placeholder 1"/>
+          <p:cNvSpPr>
+            <a:spLocks noGrp="1"/>
+          </p:cNvSpPr>
+          <p:nvPr>
+            <p:ph idx="1"/>
+          </p:nvPr>
+        </p:nvSpPr>
+        <p:spPr/>
+        <p:txBody>
+          <a:bodyPr/>
+          <a:lstStyle/>
+          <a:p>
+            <a:endParaRPr lang="en-CA"/>
+          </a:p>
+        </p:txBody>
+      </p:sp>
+      <p:sp>
+        <p:nvSpPr>
+          <p:cNvPr id="3" name="Title 2"/>
+          <p:cNvSpPr>
+            <a:spLocks noGrp="1"/>
+          </p:cNvSpPr>
+          <p:nvPr>
+            <p:ph type="title"/>
+          </p:nvPr>
+        </p:nvSpPr>
+        <p:spPr/>
+        <p:txBody>
+          <a:bodyPr/>
+          <a:lstStyle/>
+          <a:p>
+            <a:r>
+              <a:rPr lang="en-CA" dirty="0" smtClean="0"/>
+              <a:t>Questions</a:t>
+            </a:r>
+            <a:endParaRPr lang="en-CA" dirty="0"/>
+          </a:p>
+        </p:txBody>
+      </p:sp>
+      <p:pic>
+        <p:nvPicPr>
+          <p:cNvPr id="2050" name="Picture 2" descr="http://s2.quickmeme.com/img/d6/d6cab529f5e1ecf8ffecab3d7f75f9095f7400c431a9724de6b120469d300d6e.jpg"/>
+          <p:cNvPicPr>
+            <a:picLocks noChangeAspect="1" noChangeArrowheads="1"/>
+          </p:cNvPicPr>
+          <p:nvPr/>
+        </p:nvPicPr>
+        <p:blipFill>
+          <a:blip r:embed="rId2" cstate="print"/>
+          <a:srcRect/>
+          <a:stretch>
+            <a:fillRect/>
+          </a:stretch>
+        </p:blipFill>
+        <p:spPr bwMode="auto">
+          <a:xfrm>
+            <a:off x="3879276" y="312928"/>
+            <a:ext cx="4762500" cy="5029201"/>
+          </a:xfrm>
+          <a:prstGeom prst="rect">
+            <a:avLst/>
+          </a:prstGeom>
+          <a:noFill/>
+        </p:spPr>
+      </p:pic>
+    </p:spTree>
+  </p:cSld>
+  <p:clrMapOvr>
+    <a:masterClrMapping/>
+  </p:clrMapOvr>
 </p:sld>
 </file>
 
@@ -3798,20 +5204,23 @@
           <a:p>
             <a:r>
               <a:rPr lang="en-US" dirty="0" smtClean="0"/>
-              <a:t>What</a:t>
-            </a:r>
+              <a:t>Scenario Overviews</a:t>
+            </a:r>
+            <a:endParaRPr lang="en-US" dirty="0" smtClean="0"/>
           </a:p>
           <a:p>
             <a:r>
               <a:rPr lang="en-US" dirty="0" smtClean="0"/>
-              <a:t>Where</a:t>
-            </a:r>
+              <a:t>Expected Results</a:t>
+            </a:r>
+            <a:endParaRPr lang="en-US" dirty="0" smtClean="0"/>
           </a:p>
           <a:p>
             <a:r>
               <a:rPr lang="en-US" dirty="0" smtClean="0"/>
-              <a:t>When</a:t>
-            </a:r>
+              <a:t>Limitations</a:t>
+            </a:r>
+            <a:endParaRPr lang="en-US" dirty="0" smtClean="0"/>
           </a:p>
         </p:txBody>
       </p:sp>
@@ -3830,14 +5239,18 @@
           <a:bodyPr/>
           <a:lstStyle/>
           <a:p>
-            <a:endParaRPr lang="en-US"/>
+            <a:r>
+              <a:rPr lang="en-US" dirty="0" smtClean="0"/>
+              <a:t>Overview</a:t>
+            </a:r>
+            <a:endParaRPr lang="en-US" dirty="0"/>
           </a:p>
         </p:txBody>
       </p:sp>
     </p:spTree>
     <p:extLst>
       <p:ext uri="{BB962C8B-B14F-4D97-AF65-F5344CB8AC3E}">
-        <p14:creationId xmlns:p14="http://schemas.microsoft.com/office/powerpoint/2010/main" val="3663057432"/>
+        <p14:creationId xmlns:p14="http://schemas.microsoft.com/office/powerpoint/2010/main" xmlns="" val="3663057432"/>
       </p:ext>
     </p:extLst>
   </p:cSld>
@@ -3847,10 +5260,655 @@
   <p:timing>
     <p:tnLst>
       <p:par>
-        <p:cTn xmlns:p14="http://schemas.microsoft.com/office/powerpoint/2010/main" id="1" dur="indefinite" restart="never" nodeType="tmRoot"/>
+        <p:cTn id="1" dur="indefinite" restart="never" nodeType="tmRoot"/>
       </p:par>
     </p:tnLst>
   </p:timing>
+</p:sld>
+</file>
+
+<file path=ppt/slides/slide3.xml><?xml version="1.0" encoding="utf-8"?>
+<p:sld xmlns:a="http://schemas.openxmlformats.org/drawingml/2006/main" xmlns:r="http://schemas.openxmlformats.org/officeDocument/2006/relationships" xmlns:p="http://schemas.openxmlformats.org/presentationml/2006/main">
+  <p:cSld>
+    <p:spTree>
+      <p:nvGrpSpPr>
+        <p:cNvPr id="1" name=""/>
+        <p:cNvGrpSpPr/>
+        <p:nvPr/>
+      </p:nvGrpSpPr>
+      <p:grpSpPr>
+        <a:xfrm>
+          <a:off x="0" y="0"/>
+          <a:ext cx="0" cy="0"/>
+          <a:chOff x="0" y="0"/>
+          <a:chExt cx="0" cy="0"/>
+        </a:xfrm>
+      </p:grpSpPr>
+      <p:sp>
+        <p:nvSpPr>
+          <p:cNvPr id="3" name="Title 2"/>
+          <p:cNvSpPr>
+            <a:spLocks noGrp="1"/>
+          </p:cNvSpPr>
+          <p:nvPr>
+            <p:ph type="title"/>
+          </p:nvPr>
+        </p:nvSpPr>
+        <p:spPr/>
+        <p:txBody>
+          <a:bodyPr/>
+          <a:lstStyle/>
+          <a:p>
+            <a:r>
+              <a:rPr lang="en-CA" dirty="0" smtClean="0"/>
+              <a:t>VPN Scenario</a:t>
+            </a:r>
+            <a:endParaRPr lang="en-CA" dirty="0"/>
+          </a:p>
+        </p:txBody>
+      </p:sp>
+      <p:pic>
+        <p:nvPicPr>
+          <p:cNvPr id="4" name="Content Placeholder 3"/>
+          <p:cNvPicPr>
+            <a:picLocks noGrp="1"/>
+          </p:cNvPicPr>
+          <p:nvPr>
+            <p:ph idx="1"/>
+          </p:nvPr>
+        </p:nvPicPr>
+        <p:blipFill>
+          <a:blip r:embed="rId3" cstate="print"/>
+          <a:srcRect/>
+          <a:stretch>
+            <a:fillRect/>
+          </a:stretch>
+        </p:blipFill>
+        <p:spPr bwMode="auto">
+          <a:xfrm>
+            <a:off x="777240" y="509530"/>
+            <a:ext cx="7965443" cy="4367270"/>
+          </a:xfrm>
+          <a:prstGeom prst="rect">
+            <a:avLst/>
+          </a:prstGeom>
+          <a:noFill/>
+          <a:ln w="9525">
+            <a:noFill/>
+            <a:miter lim="800000"/>
+            <a:headEnd/>
+            <a:tailEnd/>
+          </a:ln>
+        </p:spPr>
+      </p:pic>
+    </p:spTree>
+  </p:cSld>
+  <p:clrMapOvr>
+    <a:masterClrMapping/>
+  </p:clrMapOvr>
+  <p:timing>
+    <p:tnLst>
+      <p:par>
+        <p:cTn id="1" dur="indefinite" restart="never" nodeType="tmRoot"/>
+      </p:par>
+    </p:tnLst>
+  </p:timing>
+</p:sld>
+</file>
+
+<file path=ppt/slides/slide4.xml><?xml version="1.0" encoding="utf-8"?>
+<p:sld xmlns:a="http://schemas.openxmlformats.org/drawingml/2006/main" xmlns:r="http://schemas.openxmlformats.org/officeDocument/2006/relationships" xmlns:p="http://schemas.openxmlformats.org/presentationml/2006/main">
+  <p:cSld>
+    <p:spTree>
+      <p:nvGrpSpPr>
+        <p:cNvPr id="1" name=""/>
+        <p:cNvGrpSpPr/>
+        <p:nvPr/>
+      </p:nvGrpSpPr>
+      <p:grpSpPr>
+        <a:xfrm>
+          <a:off x="0" y="0"/>
+          <a:ext cx="0" cy="0"/>
+          <a:chOff x="0" y="0"/>
+          <a:chExt cx="0" cy="0"/>
+        </a:xfrm>
+      </p:grpSpPr>
+      <p:sp>
+        <p:nvSpPr>
+          <p:cNvPr id="3" name="Title 2"/>
+          <p:cNvSpPr>
+            <a:spLocks noGrp="1"/>
+          </p:cNvSpPr>
+          <p:nvPr>
+            <p:ph type="title"/>
+          </p:nvPr>
+        </p:nvSpPr>
+        <p:spPr/>
+        <p:txBody>
+          <a:bodyPr/>
+          <a:lstStyle/>
+          <a:p>
+            <a:r>
+              <a:rPr lang="en-CA" dirty="0" smtClean="0"/>
+              <a:t>Firewall Only</a:t>
+            </a:r>
+            <a:endParaRPr lang="en-CA" dirty="0"/>
+          </a:p>
+        </p:txBody>
+      </p:sp>
+      <p:pic>
+        <p:nvPicPr>
+          <p:cNvPr id="4" name="Content Placeholder 3"/>
+          <p:cNvPicPr>
+            <a:picLocks noGrp="1"/>
+          </p:cNvPicPr>
+          <p:nvPr>
+            <p:ph idx="1"/>
+          </p:nvPr>
+        </p:nvPicPr>
+        <p:blipFill>
+          <a:blip r:embed="rId2" cstate="print"/>
+          <a:srcRect/>
+          <a:stretch>
+            <a:fillRect/>
+          </a:stretch>
+        </p:blipFill>
+        <p:spPr bwMode="auto">
+          <a:xfrm>
+            <a:off x="969484" y="531564"/>
+            <a:ext cx="7351556" cy="4191000"/>
+          </a:xfrm>
+          <a:prstGeom prst="rect">
+            <a:avLst/>
+          </a:prstGeom>
+          <a:noFill/>
+          <a:ln w="9525">
+            <a:noFill/>
+            <a:miter lim="800000"/>
+            <a:headEnd/>
+            <a:tailEnd/>
+          </a:ln>
+        </p:spPr>
+      </p:pic>
+    </p:spTree>
+  </p:cSld>
+  <p:clrMapOvr>
+    <a:masterClrMapping/>
+  </p:clrMapOvr>
+  <p:timing>
+    <p:tnLst>
+      <p:par>
+        <p:cTn id="1" dur="indefinite" restart="never" nodeType="tmRoot"/>
+      </p:par>
+    </p:tnLst>
+  </p:timing>
+</p:sld>
+</file>
+
+<file path=ppt/slides/slide5.xml><?xml version="1.0" encoding="utf-8"?>
+<p:sld xmlns:a="http://schemas.openxmlformats.org/drawingml/2006/main" xmlns:r="http://schemas.openxmlformats.org/officeDocument/2006/relationships" xmlns:p="http://schemas.openxmlformats.org/presentationml/2006/main">
+  <p:cSld>
+    <p:spTree>
+      <p:nvGrpSpPr>
+        <p:cNvPr id="1" name=""/>
+        <p:cNvGrpSpPr/>
+        <p:nvPr/>
+      </p:nvGrpSpPr>
+      <p:grpSpPr>
+        <a:xfrm>
+          <a:off x="0" y="0"/>
+          <a:ext cx="0" cy="0"/>
+          <a:chOff x="0" y="0"/>
+          <a:chExt cx="0" cy="0"/>
+        </a:xfrm>
+      </p:grpSpPr>
+      <p:sp>
+        <p:nvSpPr>
+          <p:cNvPr id="3" name="Title 2"/>
+          <p:cNvSpPr>
+            <a:spLocks noGrp="1"/>
+          </p:cNvSpPr>
+          <p:nvPr>
+            <p:ph type="title"/>
+          </p:nvPr>
+        </p:nvSpPr>
+        <p:spPr>
+          <a:xfrm>
+            <a:off x="777240" y="5210978"/>
+            <a:ext cx="7543800" cy="914400"/>
+          </a:xfrm>
+        </p:spPr>
+        <p:txBody>
+          <a:bodyPr/>
+          <a:lstStyle/>
+          <a:p>
+            <a:r>
+              <a:rPr lang="en-CA" dirty="0" smtClean="0"/>
+              <a:t>Firewall and VPN Scenario</a:t>
+            </a:r>
+            <a:endParaRPr lang="en-CA" dirty="0"/>
+          </a:p>
+        </p:txBody>
+      </p:sp>
+      <p:pic>
+        <p:nvPicPr>
+          <p:cNvPr id="4" name="Content Placeholder 3"/>
+          <p:cNvPicPr>
+            <a:picLocks noGrp="1"/>
+          </p:cNvPicPr>
+          <p:nvPr>
+            <p:ph idx="1"/>
+          </p:nvPr>
+        </p:nvPicPr>
+        <p:blipFill>
+          <a:blip r:embed="rId2" cstate="print"/>
+          <a:srcRect/>
+          <a:stretch>
+            <a:fillRect/>
+          </a:stretch>
+        </p:blipFill>
+        <p:spPr bwMode="auto">
+          <a:xfrm>
+            <a:off x="777240" y="476479"/>
+            <a:ext cx="7543800" cy="4073487"/>
+          </a:xfrm>
+          <a:prstGeom prst="rect">
+            <a:avLst/>
+          </a:prstGeom>
+          <a:noFill/>
+          <a:ln w="9525">
+            <a:noFill/>
+            <a:miter lim="800000"/>
+            <a:headEnd/>
+            <a:tailEnd/>
+          </a:ln>
+        </p:spPr>
+      </p:pic>
+    </p:spTree>
+  </p:cSld>
+  <p:clrMapOvr>
+    <a:masterClrMapping/>
+  </p:clrMapOvr>
+  <p:timing>
+    <p:tnLst>
+      <p:par>
+        <p:cTn id="1" dur="indefinite" restart="never" nodeType="tmRoot"/>
+      </p:par>
+    </p:tnLst>
+  </p:timing>
+</p:sld>
+</file>
+
+<file path=ppt/slides/slide6.xml><?xml version="1.0" encoding="utf-8"?>
+<p:sld xmlns:a="http://schemas.openxmlformats.org/drawingml/2006/main" xmlns:r="http://schemas.openxmlformats.org/officeDocument/2006/relationships" xmlns:p="http://schemas.openxmlformats.org/presentationml/2006/main">
+  <p:cSld>
+    <p:spTree>
+      <p:nvGrpSpPr>
+        <p:cNvPr id="1" name=""/>
+        <p:cNvGrpSpPr/>
+        <p:nvPr/>
+      </p:nvGrpSpPr>
+      <p:grpSpPr>
+        <a:xfrm>
+          <a:off x="0" y="0"/>
+          <a:ext cx="0" cy="0"/>
+          <a:chOff x="0" y="0"/>
+          <a:chExt cx="0" cy="0"/>
+        </a:xfrm>
+      </p:grpSpPr>
+      <p:sp>
+        <p:nvSpPr>
+          <p:cNvPr id="2" name="Content Placeholder 1"/>
+          <p:cNvSpPr>
+            <a:spLocks noGrp="1"/>
+          </p:cNvSpPr>
+          <p:nvPr>
+            <p:ph idx="1"/>
+          </p:nvPr>
+        </p:nvSpPr>
+        <p:spPr/>
+        <p:txBody>
+          <a:bodyPr/>
+          <a:lstStyle/>
+          <a:p>
+            <a:endParaRPr lang="en-CA"/>
+          </a:p>
+        </p:txBody>
+      </p:sp>
+      <p:sp>
+        <p:nvSpPr>
+          <p:cNvPr id="3" name="Title 2"/>
+          <p:cNvSpPr>
+            <a:spLocks noGrp="1"/>
+          </p:cNvSpPr>
+          <p:nvPr>
+            <p:ph type="title"/>
+          </p:nvPr>
+        </p:nvSpPr>
+        <p:spPr/>
+        <p:txBody>
+          <a:bodyPr/>
+          <a:lstStyle/>
+          <a:p>
+            <a:r>
+              <a:rPr lang="en-CA" dirty="0" smtClean="0"/>
+              <a:t>Wireless clients</a:t>
+            </a:r>
+            <a:endParaRPr lang="en-CA" dirty="0"/>
+          </a:p>
+        </p:txBody>
+      </p:sp>
+      <p:pic>
+        <p:nvPicPr>
+          <p:cNvPr id="1026" name="Picture 2"/>
+          <p:cNvPicPr>
+            <a:picLocks noChangeAspect="1" noChangeArrowheads="1"/>
+          </p:cNvPicPr>
+          <p:nvPr/>
+        </p:nvPicPr>
+        <p:blipFill>
+          <a:blip r:embed="rId2" cstate="print"/>
+          <a:srcRect/>
+          <a:stretch>
+            <a:fillRect/>
+          </a:stretch>
+        </p:blipFill>
+        <p:spPr bwMode="auto">
+          <a:xfrm>
+            <a:off x="727056" y="185107"/>
+            <a:ext cx="7502544" cy="4782744"/>
+          </a:xfrm>
+          <a:prstGeom prst="rect">
+            <a:avLst/>
+          </a:prstGeom>
+          <a:noFill/>
+          <a:ln w="9525">
+            <a:noFill/>
+            <a:miter lim="800000"/>
+            <a:headEnd/>
+            <a:tailEnd/>
+          </a:ln>
+        </p:spPr>
+      </p:pic>
+    </p:spTree>
+  </p:cSld>
+  <p:clrMapOvr>
+    <a:masterClrMapping/>
+  </p:clrMapOvr>
+  <p:timing>
+    <p:tnLst>
+      <p:par>
+        <p:cTn id="1" dur="indefinite" restart="never" nodeType="tmRoot"/>
+      </p:par>
+    </p:tnLst>
+  </p:timing>
+</p:sld>
+</file>
+
+<file path=ppt/slides/slide7.xml><?xml version="1.0" encoding="utf-8"?>
+<p:sld xmlns:a="http://schemas.openxmlformats.org/drawingml/2006/main" xmlns:r="http://schemas.openxmlformats.org/officeDocument/2006/relationships" xmlns:p="http://schemas.openxmlformats.org/presentationml/2006/main">
+  <p:cSld>
+    <p:spTree>
+      <p:nvGrpSpPr>
+        <p:cNvPr id="1" name=""/>
+        <p:cNvGrpSpPr/>
+        <p:nvPr/>
+      </p:nvGrpSpPr>
+      <p:grpSpPr>
+        <a:xfrm>
+          <a:off x="0" y="0"/>
+          <a:ext cx="0" cy="0"/>
+          <a:chOff x="0" y="0"/>
+          <a:chExt cx="0" cy="0"/>
+        </a:xfrm>
+      </p:grpSpPr>
+      <p:sp>
+        <p:nvSpPr>
+          <p:cNvPr id="3" name="Title 2"/>
+          <p:cNvSpPr>
+            <a:spLocks noGrp="1"/>
+          </p:cNvSpPr>
+          <p:nvPr>
+            <p:ph type="title"/>
+          </p:nvPr>
+        </p:nvSpPr>
+        <p:spPr/>
+        <p:txBody>
+          <a:bodyPr/>
+          <a:lstStyle/>
+          <a:p>
+            <a:r>
+              <a:rPr lang="en-CA" dirty="0" smtClean="0"/>
+              <a:t>Data Results</a:t>
+            </a:r>
+            <a:endParaRPr lang="en-CA" dirty="0"/>
+          </a:p>
+        </p:txBody>
+      </p:sp>
+      <p:sp>
+        <p:nvSpPr>
+          <p:cNvPr id="5" name="Content Placeholder 4"/>
+          <p:cNvSpPr>
+            <a:spLocks noGrp="1"/>
+          </p:cNvSpPr>
+          <p:nvPr>
+            <p:ph idx="1"/>
+          </p:nvPr>
+        </p:nvSpPr>
+        <p:spPr/>
+        <p:txBody>
+          <a:bodyPr/>
+          <a:lstStyle/>
+          <a:p>
+            <a:r>
+              <a:rPr lang="en-CA" dirty="0" smtClean="0"/>
+              <a:t>Database  Query Traffic Sent and Received</a:t>
+            </a:r>
+          </a:p>
+          <a:p>
+            <a:r>
+              <a:rPr lang="en-CA" dirty="0" smtClean="0"/>
+              <a:t>Database Query Response Time</a:t>
+            </a:r>
+          </a:p>
+          <a:p>
+            <a:r>
+              <a:rPr lang="en-CA" dirty="0" smtClean="0"/>
+              <a:t>HTTP Traffic Sent and Received</a:t>
+            </a:r>
+          </a:p>
+          <a:p>
+            <a:r>
+              <a:rPr lang="en-CA" dirty="0" smtClean="0"/>
+              <a:t>HTTP Response Time</a:t>
+            </a:r>
+            <a:endParaRPr lang="en-CA" dirty="0"/>
+          </a:p>
+        </p:txBody>
+      </p:sp>
+    </p:spTree>
+  </p:cSld>
+  <p:clrMapOvr>
+    <a:masterClrMapping/>
+  </p:clrMapOvr>
+  <p:timing>
+    <p:tnLst>
+      <p:par>
+        <p:cTn id="1" dur="indefinite" restart="never" nodeType="tmRoot"/>
+      </p:par>
+    </p:tnLst>
+  </p:timing>
+</p:sld>
+</file>
+
+<file path=ppt/slides/slide8.xml><?xml version="1.0" encoding="utf-8"?>
+<p:sld xmlns:a="http://schemas.openxmlformats.org/drawingml/2006/main" xmlns:r="http://schemas.openxmlformats.org/officeDocument/2006/relationships" xmlns:p="http://schemas.openxmlformats.org/presentationml/2006/main">
+  <p:cSld>
+    <p:spTree>
+      <p:nvGrpSpPr>
+        <p:cNvPr id="1" name=""/>
+        <p:cNvGrpSpPr/>
+        <p:nvPr/>
+      </p:nvGrpSpPr>
+      <p:grpSpPr>
+        <a:xfrm>
+          <a:off x="0" y="0"/>
+          <a:ext cx="0" cy="0"/>
+          <a:chOff x="0" y="0"/>
+          <a:chExt cx="0" cy="0"/>
+        </a:xfrm>
+      </p:grpSpPr>
+      <p:sp>
+        <p:nvSpPr>
+          <p:cNvPr id="3" name="Title 2"/>
+          <p:cNvSpPr>
+            <a:spLocks noGrp="1"/>
+          </p:cNvSpPr>
+          <p:nvPr>
+            <p:ph type="title"/>
+          </p:nvPr>
+        </p:nvSpPr>
+        <p:spPr/>
+        <p:txBody>
+          <a:bodyPr/>
+          <a:lstStyle/>
+          <a:p>
+            <a:r>
+              <a:rPr lang="en-CA" dirty="0" smtClean="0"/>
+              <a:t>DB – Traffic Sent</a:t>
+            </a:r>
+            <a:endParaRPr lang="en-CA" dirty="0"/>
+          </a:p>
+        </p:txBody>
+      </p:sp>
+      <p:pic>
+        <p:nvPicPr>
+          <p:cNvPr id="4" name="Content Placeholder 3"/>
+          <p:cNvPicPr>
+            <a:picLocks noGrp="1"/>
+          </p:cNvPicPr>
+          <p:nvPr>
+            <p:ph idx="1"/>
+          </p:nvPr>
+        </p:nvPicPr>
+        <p:blipFill>
+          <a:blip r:embed="rId2" cstate="print"/>
+          <a:srcRect/>
+          <a:stretch>
+            <a:fillRect/>
+          </a:stretch>
+        </p:blipFill>
+        <p:spPr bwMode="auto">
+          <a:xfrm>
+            <a:off x="260732" y="264010"/>
+            <a:ext cx="8684963" cy="4612789"/>
+          </a:xfrm>
+          <a:prstGeom prst="rect">
+            <a:avLst/>
+          </a:prstGeom>
+          <a:noFill/>
+          <a:ln w="9525">
+            <a:noFill/>
+            <a:miter lim="800000"/>
+            <a:headEnd/>
+            <a:tailEnd/>
+          </a:ln>
+        </p:spPr>
+      </p:pic>
+    </p:spTree>
+  </p:cSld>
+  <p:clrMapOvr>
+    <a:masterClrMapping/>
+  </p:clrMapOvr>
+  <p:timing>
+    <p:tnLst>
+      <p:par>
+        <p:cTn id="1" dur="indefinite" restart="never" nodeType="tmRoot"/>
+      </p:par>
+    </p:tnLst>
+  </p:timing>
+</p:sld>
+</file>
+
+<file path=ppt/slides/slide9.xml><?xml version="1.0" encoding="utf-8"?>
+<p:sld xmlns:a="http://schemas.openxmlformats.org/drawingml/2006/main" xmlns:r="http://schemas.openxmlformats.org/officeDocument/2006/relationships" xmlns:p="http://schemas.openxmlformats.org/presentationml/2006/main">
+  <p:cSld>
+    <p:spTree>
+      <p:nvGrpSpPr>
+        <p:cNvPr id="1" name=""/>
+        <p:cNvGrpSpPr/>
+        <p:nvPr/>
+      </p:nvGrpSpPr>
+      <p:grpSpPr>
+        <a:xfrm>
+          <a:off x="0" y="0"/>
+          <a:ext cx="0" cy="0"/>
+          <a:chOff x="0" y="0"/>
+          <a:chExt cx="0" cy="0"/>
+        </a:xfrm>
+      </p:grpSpPr>
+      <p:sp>
+        <p:nvSpPr>
+          <p:cNvPr id="3" name="Title 2"/>
+          <p:cNvSpPr>
+            <a:spLocks noGrp="1"/>
+          </p:cNvSpPr>
+          <p:nvPr>
+            <p:ph type="title"/>
+          </p:nvPr>
+        </p:nvSpPr>
+        <p:spPr/>
+        <p:txBody>
+          <a:bodyPr/>
+          <a:lstStyle/>
+          <a:p>
+            <a:r>
+              <a:rPr lang="en-CA" dirty="0" smtClean="0"/>
+              <a:t>DB – Traffic Received</a:t>
+            </a:r>
+            <a:endParaRPr lang="en-CA" dirty="0"/>
+          </a:p>
+        </p:txBody>
+      </p:sp>
+      <p:pic>
+        <p:nvPicPr>
+          <p:cNvPr id="4" name="Content Placeholder 3"/>
+          <p:cNvPicPr>
+            <a:picLocks noGrp="1"/>
+          </p:cNvPicPr>
+          <p:nvPr>
+            <p:ph idx="1"/>
+          </p:nvPr>
+        </p:nvPicPr>
+        <p:blipFill>
+          <a:blip r:embed="rId2" cstate="print"/>
+          <a:srcRect/>
+          <a:stretch>
+            <a:fillRect/>
+          </a:stretch>
+        </p:blipFill>
+        <p:spPr bwMode="auto">
+          <a:xfrm>
+            <a:off x="227682" y="187288"/>
+            <a:ext cx="8563778" cy="4516915"/>
+          </a:xfrm>
+          <a:prstGeom prst="rect">
+            <a:avLst/>
+          </a:prstGeom>
+          <a:noFill/>
+          <a:ln w="9525">
+            <a:noFill/>
+            <a:miter lim="800000"/>
+            <a:headEnd/>
+            <a:tailEnd/>
+          </a:ln>
+        </p:spPr>
+      </p:pic>
+    </p:spTree>
+  </p:cSld>
+  <p:clrMapOvr>
+    <a:masterClrMapping/>
+  </p:clrMapOvr>
 </p:sld>
 </file>
 
@@ -4129,4 +6187,287 @@
   <a:objectDefaults/>
   <a:extraClrSchemeLst/>
 </a:theme>
+</file>
+
+<file path=ppt/theme/theme2.xml><?xml version="1.0" encoding="utf-8"?>
+<a:theme xmlns:a="http://schemas.openxmlformats.org/drawingml/2006/main" name="Office Theme">
+  <a:themeElements>
+    <a:clrScheme name="Office">
+      <a:dk1>
+        <a:sysClr val="windowText" lastClr="000000"/>
+      </a:dk1>
+      <a:lt1>
+        <a:sysClr val="window" lastClr="FFFFFF"/>
+      </a:lt1>
+      <a:dk2>
+        <a:srgbClr val="1F497D"/>
+      </a:dk2>
+      <a:lt2>
+        <a:srgbClr val="EEECE1"/>
+      </a:lt2>
+      <a:accent1>
+        <a:srgbClr val="4F81BD"/>
+      </a:accent1>
+      <a:accent2>
+        <a:srgbClr val="C0504D"/>
+      </a:accent2>
+      <a:accent3>
+        <a:srgbClr val="9BBB59"/>
+      </a:accent3>
+      <a:accent4>
+        <a:srgbClr val="8064A2"/>
+      </a:accent4>
+      <a:accent5>
+        <a:srgbClr val="4BACC6"/>
+      </a:accent5>
+      <a:accent6>
+        <a:srgbClr val="F79646"/>
+      </a:accent6>
+      <a:hlink>
+        <a:srgbClr val="0000FF"/>
+      </a:hlink>
+      <a:folHlink>
+        <a:srgbClr val="800080"/>
+      </a:folHlink>
+    </a:clrScheme>
+    <a:fontScheme name="Office">
+      <a:majorFont>
+        <a:latin typeface="Calibri"/>
+        <a:ea typeface=""/>
+        <a:cs typeface=""/>
+        <a:font script="Jpan" typeface="ＭＳ Ｐゴシック"/>
+        <a:font script="Hang" typeface="맑은 고딕"/>
+        <a:font script="Hans" typeface="宋体"/>
+        <a:font script="Hant" typeface="新細明體"/>
+        <a:font script="Arab" typeface="Times New Roman"/>
+        <a:font script="Hebr" typeface="Times New Roman"/>
+        <a:font script="Thai" typeface="Angsana New"/>
+        <a:font script="Ethi" typeface="Nyala"/>
+        <a:font script="Beng" typeface="Vrinda"/>
+        <a:font script="Gujr" typeface="Shruti"/>
+        <a:font script="Khmr" typeface="MoolBoran"/>
+        <a:font script="Knda" typeface="Tunga"/>
+        <a:font script="Guru" typeface="Raavi"/>
+        <a:font script="Cans" typeface="Euphemia"/>
+        <a:font script="Cher" typeface="Plantagenet Cherokee"/>
+        <a:font script="Yiii" typeface="Microsoft Yi Baiti"/>
+        <a:font script="Tibt" typeface="Microsoft Himalaya"/>
+        <a:font script="Thaa" typeface="MV Boli"/>
+        <a:font script="Deva" typeface="Mangal"/>
+        <a:font script="Telu" typeface="Gautami"/>
+        <a:font script="Taml" typeface="Latha"/>
+        <a:font script="Syrc" typeface="Estrangelo Edessa"/>
+        <a:font script="Orya" typeface="Kalinga"/>
+        <a:font script="Mlym" typeface="Kartika"/>
+        <a:font script="Laoo" typeface="DokChampa"/>
+        <a:font script="Sinh" typeface="Iskoola Pota"/>
+        <a:font script="Mong" typeface="Mongolian Baiti"/>
+        <a:font script="Viet" typeface="Times New Roman"/>
+        <a:font script="Uigh" typeface="Microsoft Uighur"/>
+      </a:majorFont>
+      <a:minorFont>
+        <a:latin typeface="Calibri"/>
+        <a:ea typeface=""/>
+        <a:cs typeface=""/>
+        <a:font script="Jpan" typeface="ＭＳ Ｐゴシック"/>
+        <a:font script="Hang" typeface="맑은 고딕"/>
+        <a:font script="Hans" typeface="宋体"/>
+        <a:font script="Hant" typeface="新細明體"/>
+        <a:font script="Arab" typeface="Arial"/>
+        <a:font script="Hebr" typeface="Arial"/>
+        <a:font script="Thai" typeface="Cordia New"/>
+        <a:font script="Ethi" typeface="Nyala"/>
+        <a:font script="Beng" typeface="Vrinda"/>
+        <a:font script="Gujr" typeface="Shruti"/>
+        <a:font script="Khmr" typeface="DaunPenh"/>
+        <a:font script="Knda" typeface="Tunga"/>
+        <a:font script="Guru" typeface="Raavi"/>
+        <a:font script="Cans" typeface="Euphemia"/>
+        <a:font script="Cher" typeface="Plantagenet Cherokee"/>
+        <a:font script="Yiii" typeface="Microsoft Yi Baiti"/>
+        <a:font script="Tibt" typeface="Microsoft Himalaya"/>
+        <a:font script="Thaa" typeface="MV Boli"/>
+        <a:font script="Deva" typeface="Mangal"/>
+        <a:font script="Telu" typeface="Gautami"/>
+        <a:font script="Taml" typeface="Latha"/>
+        <a:font script="Syrc" typeface="Estrangelo Edessa"/>
+        <a:font script="Orya" typeface="Kalinga"/>
+        <a:font script="Mlym" typeface="Kartika"/>
+        <a:font script="Laoo" typeface="DokChampa"/>
+        <a:font script="Sinh" typeface="Iskoola Pota"/>
+        <a:font script="Mong" typeface="Mongolian Baiti"/>
+        <a:font script="Viet" typeface="Arial"/>
+        <a:font script="Uigh" typeface="Microsoft Uighur"/>
+      </a:minorFont>
+    </a:fontScheme>
+    <a:fmtScheme name="Office">
+      <a:fillStyleLst>
+        <a:solidFill>
+          <a:schemeClr val="phClr"/>
+        </a:solidFill>
+        <a:gradFill rotWithShape="1">
+          <a:gsLst>
+            <a:gs pos="0">
+              <a:schemeClr val="phClr">
+                <a:tint val="50000"/>
+                <a:satMod val="300000"/>
+              </a:schemeClr>
+            </a:gs>
+            <a:gs pos="35000">
+              <a:schemeClr val="phClr">
+                <a:tint val="37000"/>
+                <a:satMod val="300000"/>
+              </a:schemeClr>
+            </a:gs>
+            <a:gs pos="100000">
+              <a:schemeClr val="phClr">
+                <a:tint val="15000"/>
+                <a:satMod val="350000"/>
+              </a:schemeClr>
+            </a:gs>
+          </a:gsLst>
+          <a:lin ang="16200000" scaled="1"/>
+        </a:gradFill>
+        <a:gradFill rotWithShape="1">
+          <a:gsLst>
+            <a:gs pos="0">
+              <a:schemeClr val="phClr">
+                <a:shade val="51000"/>
+                <a:satMod val="130000"/>
+              </a:schemeClr>
+            </a:gs>
+            <a:gs pos="80000">
+              <a:schemeClr val="phClr">
+                <a:shade val="93000"/>
+                <a:satMod val="130000"/>
+              </a:schemeClr>
+            </a:gs>
+            <a:gs pos="100000">
+              <a:schemeClr val="phClr">
+                <a:shade val="94000"/>
+                <a:satMod val="135000"/>
+              </a:schemeClr>
+            </a:gs>
+          </a:gsLst>
+          <a:lin ang="16200000" scaled="0"/>
+        </a:gradFill>
+      </a:fillStyleLst>
+      <a:lnStyleLst>
+        <a:ln w="9525" cap="flat" cmpd="sng" algn="ctr">
+          <a:solidFill>
+            <a:schemeClr val="phClr">
+              <a:shade val="95000"/>
+              <a:satMod val="105000"/>
+            </a:schemeClr>
+          </a:solidFill>
+          <a:prstDash val="solid"/>
+        </a:ln>
+        <a:ln w="25400" cap="flat" cmpd="sng" algn="ctr">
+          <a:solidFill>
+            <a:schemeClr val="phClr"/>
+          </a:solidFill>
+          <a:prstDash val="solid"/>
+        </a:ln>
+        <a:ln w="38100" cap="flat" cmpd="sng" algn="ctr">
+          <a:solidFill>
+            <a:schemeClr val="phClr"/>
+          </a:solidFill>
+          <a:prstDash val="solid"/>
+        </a:ln>
+      </a:lnStyleLst>
+      <a:effectStyleLst>
+        <a:effectStyle>
+          <a:effectLst>
+            <a:outerShdw blurRad="40000" dist="20000" dir="5400000" rotWithShape="0">
+              <a:srgbClr val="000000">
+                <a:alpha val="38000"/>
+              </a:srgbClr>
+            </a:outerShdw>
+          </a:effectLst>
+        </a:effectStyle>
+        <a:effectStyle>
+          <a:effectLst>
+            <a:outerShdw blurRad="40000" dist="23000" dir="5400000" rotWithShape="0">
+              <a:srgbClr val="000000">
+                <a:alpha val="35000"/>
+              </a:srgbClr>
+            </a:outerShdw>
+          </a:effectLst>
+        </a:effectStyle>
+        <a:effectStyle>
+          <a:effectLst>
+            <a:outerShdw blurRad="40000" dist="23000" dir="5400000" rotWithShape="0">
+              <a:srgbClr val="000000">
+                <a:alpha val="35000"/>
+              </a:srgbClr>
+            </a:outerShdw>
+          </a:effectLst>
+          <a:scene3d>
+            <a:camera prst="orthographicFront">
+              <a:rot lat="0" lon="0" rev="0"/>
+            </a:camera>
+            <a:lightRig rig="threePt" dir="t">
+              <a:rot lat="0" lon="0" rev="1200000"/>
+            </a:lightRig>
+          </a:scene3d>
+          <a:sp3d>
+            <a:bevelT w="63500" h="25400"/>
+          </a:sp3d>
+        </a:effectStyle>
+      </a:effectStyleLst>
+      <a:bgFillStyleLst>
+        <a:solidFill>
+          <a:schemeClr val="phClr"/>
+        </a:solidFill>
+        <a:gradFill rotWithShape="1">
+          <a:gsLst>
+            <a:gs pos="0">
+              <a:schemeClr val="phClr">
+                <a:tint val="40000"/>
+                <a:satMod val="350000"/>
+              </a:schemeClr>
+            </a:gs>
+            <a:gs pos="40000">
+              <a:schemeClr val="phClr">
+                <a:tint val="45000"/>
+                <a:shade val="99000"/>
+                <a:satMod val="350000"/>
+              </a:schemeClr>
+            </a:gs>
+            <a:gs pos="100000">
+              <a:schemeClr val="phClr">
+                <a:shade val="20000"/>
+                <a:satMod val="255000"/>
+              </a:schemeClr>
+            </a:gs>
+          </a:gsLst>
+          <a:path path="circle">
+            <a:fillToRect l="50000" t="-80000" r="50000" b="180000"/>
+          </a:path>
+        </a:gradFill>
+        <a:gradFill rotWithShape="1">
+          <a:gsLst>
+            <a:gs pos="0">
+              <a:schemeClr val="phClr">
+                <a:tint val="80000"/>
+                <a:satMod val="300000"/>
+              </a:schemeClr>
+            </a:gs>
+            <a:gs pos="100000">
+              <a:schemeClr val="phClr">
+                <a:shade val="30000"/>
+                <a:satMod val="200000"/>
+              </a:schemeClr>
+            </a:gs>
+          </a:gsLst>
+          <a:path path="circle">
+            <a:fillToRect l="50000" t="50000" r="50000" b="50000"/>
+          </a:path>
+        </a:gradFill>
+      </a:bgFillStyleLst>
+    </a:fmtScheme>
+  </a:themeElements>
+  <a:objectDefaults/>
+  <a:extraClrSchemeLst/>
+</a:theme>
 </file>
</xml_diff>